<commit_message>
actualizo ppts clases 2 y 3
</commit_message>
<xml_diff>
--- a/clase2/teorica_2.pptx
+++ b/clase2/teorica_2.pptx
@@ -13,7 +13,7 @@
     <p:sldId id="265" r:id="rId4"/>
     <p:sldId id="267" r:id="rId5"/>
     <p:sldId id="268" r:id="rId6"/>
-    <p:sldId id="270" r:id="rId7"/>
+    <p:sldId id="343" r:id="rId7"/>
     <p:sldId id="333" r:id="rId8"/>
     <p:sldId id="334" r:id="rId9"/>
     <p:sldId id="272" r:id="rId10"/>
@@ -3865,6 +3865,11 @@
         </p:txBody>
       </p:sp>
     </p:spTree>
+    <p:extLst>
+      <p:ext uri="{BB962C8B-B14F-4D97-AF65-F5344CB8AC3E}">
+        <p14:creationId xmlns:p14="http://schemas.microsoft.com/office/powerpoint/2010/main" val="2436975425"/>
+      </p:ext>
+    </p:extLst>
   </p:cSld>
   <p:clrMapOvr>
     <a:masterClrMapping/>
@@ -24819,12 +24824,54 @@
           <a:chExt cx="0" cy="0"/>
         </a:xfrm>
       </p:grpSpPr>
+      <p:sp>
+        <p:nvSpPr>
+          <p:cNvPr id="153" name="Google Shape;153;p27"/>
+          <p:cNvSpPr txBox="1">
+            <a:spLocks noGrp="1"/>
+          </p:cNvSpPr>
+          <p:nvPr>
+            <p:ph type="title"/>
+          </p:nvPr>
+        </p:nvSpPr>
+        <p:spPr>
+          <a:xfrm>
+            <a:off x="311700" y="137726"/>
+            <a:ext cx="8520600" cy="572700"/>
+          </a:xfrm>
+          <a:prstGeom prst="rect">
+            <a:avLst/>
+          </a:prstGeom>
+        </p:spPr>
+        <p:txBody>
+          <a:bodyPr spcFirstLastPara="1" wrap="square" lIns="91425" tIns="91425" rIns="91425" bIns="91425" anchor="t" anchorCtr="0">
+            <a:normAutofit fontScale="90000"/>
+          </a:bodyPr>
+          <a:lstStyle/>
+          <a:p>
+            <a:pPr marL="0" lvl="0" indent="0" algn="l" rtl="0">
+              <a:spcBef>
+                <a:spcPts val="0"/>
+              </a:spcBef>
+              <a:spcAft>
+                <a:spcPts val="0"/>
+              </a:spcAft>
+              <a:buNone/>
+            </a:pPr>
+            <a:r>
+              <a:rPr lang="es-MX" dirty="0"/>
+              <a:t>El gráfico siguiente muestra dos variables (𝑋 e 𝑌)</a:t>
+            </a:r>
+            <a:endParaRPr dirty="0"/>
+          </a:p>
+        </p:txBody>
+      </p:sp>
       <p:pic>
         <p:nvPicPr>
-          <p:cNvPr id="9" name="Imagen 8">
+          <p:cNvPr id="3" name="Gráfico 2">
             <a:extLst>
               <a:ext uri="{FF2B5EF4-FFF2-40B4-BE49-F238E27FC236}">
-                <a16:creationId xmlns:a16="http://schemas.microsoft.com/office/drawing/2014/main" id="{0F4CB20D-E2AC-475E-B853-0EE6DCEB6982}"/>
+                <a16:creationId xmlns:a16="http://schemas.microsoft.com/office/drawing/2014/main" id="{20429CD2-9FEB-4456-86E5-93DAC703A3CC}"/>
               </a:ext>
             </a:extLst>
           </p:cNvPr>
@@ -24833,136 +24880,34 @@
           </p:cNvPicPr>
           <p:nvPr/>
         </p:nvPicPr>
-        <p:blipFill rotWithShape="1">
-          <a:blip r:embed="rId3"/>
-          <a:srcRect r="5031"/>
-          <a:stretch/>
+        <p:blipFill>
+          <a:blip r:embed="rId3">
+            <a:extLst>
+              <a:ext uri="{96DAC541-7B7A-43D3-8B79-37D633B846F1}">
+                <asvg:svgBlip xmlns:asvg="http://schemas.microsoft.com/office/drawing/2016/SVG/main" r:embed="rId4"/>
+              </a:ext>
+            </a:extLst>
+          </a:blip>
+          <a:stretch>
+            <a:fillRect/>
+          </a:stretch>
         </p:blipFill>
         <p:spPr>
           <a:xfrm>
-            <a:off x="3690502" y="1017725"/>
-            <a:ext cx="5453498" cy="3528000"/>
+            <a:off x="4032300" y="1152474"/>
+            <a:ext cx="4800000" cy="3600000"/>
           </a:xfrm>
           <a:prstGeom prst="rect">
             <a:avLst/>
           </a:prstGeom>
         </p:spPr>
       </p:pic>
-      <mc:AlternateContent xmlns:mc="http://schemas.openxmlformats.org/markup-compatibility/2006" xmlns:a14="http://schemas.microsoft.com/office/drawing/2010/main">
-        <mc:Choice Requires="a14">
-          <p:sp>
-            <p:nvSpPr>
-              <p:cNvPr id="153" name="Google Shape;153;p27"/>
-              <p:cNvSpPr txBox="1">
-                <a:spLocks noGrp="1"/>
-              </p:cNvSpPr>
-              <p:nvPr>
-                <p:ph type="title"/>
-              </p:nvPr>
-            </p:nvSpPr>
-            <p:spPr>
-              <a:xfrm>
-                <a:off x="311700" y="445025"/>
-                <a:ext cx="8520600" cy="572700"/>
-              </a:xfrm>
-              <a:prstGeom prst="rect">
-                <a:avLst/>
-              </a:prstGeom>
-            </p:spPr>
-            <p:txBody>
-              <a:bodyPr spcFirstLastPara="1" wrap="square" lIns="91425" tIns="91425" rIns="91425" bIns="91425" anchor="t" anchorCtr="0">
-                <a:normAutofit fontScale="90000"/>
-              </a:bodyPr>
-              <a:lstStyle/>
-              <a:p>
-                <a:pPr marL="0" lvl="0" indent="0" algn="l" rtl="0">
-                  <a:spcBef>
-                    <a:spcPts val="0"/>
-                  </a:spcBef>
-                  <a:spcAft>
-                    <a:spcPts val="0"/>
-                  </a:spcAft>
-                  <a:buNone/>
-                </a:pPr>
-                <a:r>
-                  <a:rPr lang="es-MX" dirty="0"/>
-                  <a:t>El gráfico siguiente muestra dos variables (</a:t>
-                </a:r>
-                <a14:m>
-                  <m:oMath xmlns:m="http://schemas.openxmlformats.org/officeDocument/2006/math">
-                    <m:r>
-                      <a:rPr lang="es-MX" b="0" i="1" dirty="0" smtClean="0">
-                        <a:latin typeface="Cambria Math" panose="02040503050406030204" pitchFamily="18" charset="0"/>
-                      </a:rPr>
-                      <m:t>𝑋</m:t>
-                    </m:r>
-                  </m:oMath>
-                </a14:m>
-                <a:r>
-                  <a:rPr lang="es-MX" dirty="0"/>
-                  <a:t> e </a:t>
-                </a:r>
-                <a14:m>
-                  <m:oMath xmlns:m="http://schemas.openxmlformats.org/officeDocument/2006/math">
-                    <m:r>
-                      <a:rPr lang="es-MX" b="0" i="1" dirty="0" smtClean="0">
-                        <a:latin typeface="Cambria Math" panose="02040503050406030204" pitchFamily="18" charset="0"/>
-                      </a:rPr>
-                      <m:t>𝑌</m:t>
-                    </m:r>
-                  </m:oMath>
-                </a14:m>
-                <a:r>
-                  <a:rPr lang="es-MX" dirty="0"/>
-                  <a:t>)</a:t>
-                </a:r>
-                <a:endParaRPr dirty="0"/>
-              </a:p>
-            </p:txBody>
-          </p:sp>
-        </mc:Choice>
-        <mc:Fallback xmlns="">
-          <p:sp>
-            <p:nvSpPr>
-              <p:cNvPr id="153" name="Google Shape;153;p27"/>
-              <p:cNvSpPr txBox="1">
-                <a:spLocks noGrp="1" noRot="1" noChangeAspect="1" noMove="1" noResize="1" noEditPoints="1" noAdjustHandles="1" noChangeArrowheads="1" noChangeShapeType="1" noTextEdit="1"/>
-              </p:cNvSpPr>
-              <p:nvPr>
-                <p:ph type="title"/>
-              </p:nvPr>
-            </p:nvSpPr>
-            <p:spPr>
-              <a:xfrm>
-                <a:off x="311700" y="445025"/>
-                <a:ext cx="8520600" cy="572700"/>
-              </a:xfrm>
-              <a:prstGeom prst="rect">
-                <a:avLst/>
-              </a:prstGeom>
-              <a:blipFill>
-                <a:blip r:embed="rId4"/>
-                <a:stretch>
-                  <a:fillRect l="-1144" b="-15957"/>
-                </a:stretch>
-              </a:blipFill>
-            </p:spPr>
-            <p:txBody>
-              <a:bodyPr/>
-              <a:lstStyle/>
-              <a:p>
-                <a:r>
-                  <a:rPr lang="es-AR">
-                    <a:noFill/>
-                  </a:rPr>
-                  <a:t> </a:t>
-                </a:r>
-              </a:p>
-            </p:txBody>
-          </p:sp>
-        </mc:Fallback>
-      </mc:AlternateContent>
     </p:spTree>
+    <p:extLst>
+      <p:ext uri="{BB962C8B-B14F-4D97-AF65-F5344CB8AC3E}">
+        <p14:creationId xmlns:p14="http://schemas.microsoft.com/office/powerpoint/2010/main" val="1449054201"/>
+      </p:ext>
+    </p:extLst>
   </p:cSld>
   <p:clrMapOvr>
     <a:masterClrMapping/>
@@ -25029,35 +24974,6 @@
           </a:p>
         </p:txBody>
       </p:sp>
-      <p:pic>
-        <p:nvPicPr>
-          <p:cNvPr id="3" name="Imagen 2">
-            <a:extLst>
-              <a:ext uri="{FF2B5EF4-FFF2-40B4-BE49-F238E27FC236}">
-                <a16:creationId xmlns:a16="http://schemas.microsoft.com/office/drawing/2014/main" id="{E9B9C2BE-4049-4BB3-9E41-BC5BDDB81D65}"/>
-              </a:ext>
-            </a:extLst>
-          </p:cNvPr>
-          <p:cNvPicPr>
-            <a:picLocks noChangeAspect="1"/>
-          </p:cNvPicPr>
-          <p:nvPr/>
-        </p:nvPicPr>
-        <p:blipFill rotWithShape="1">
-          <a:blip r:embed="rId3"/>
-          <a:srcRect r="5090"/>
-          <a:stretch/>
-        </p:blipFill>
-        <p:spPr>
-          <a:xfrm>
-            <a:off x="3738456" y="1002739"/>
-            <a:ext cx="5400000" cy="3597477"/>
-          </a:xfrm>
-          <a:prstGeom prst="rect">
-            <a:avLst/>
-          </a:prstGeom>
-        </p:spPr>
-      </p:pic>
       <mc:AlternateContent xmlns:mc="http://schemas.openxmlformats.org/markup-compatibility/2006" xmlns:a14="http://schemas.microsoft.com/office/drawing/2010/main">
         <mc:Choice Requires="a14">
           <p:sp>
@@ -25351,6 +25267,42 @@
           </p:sp>
         </mc:Fallback>
       </mc:AlternateContent>
+      <p:pic>
+        <p:nvPicPr>
+          <p:cNvPr id="4" name="Gráfico 3">
+            <a:extLst>
+              <a:ext uri="{FF2B5EF4-FFF2-40B4-BE49-F238E27FC236}">
+                <a16:creationId xmlns:a16="http://schemas.microsoft.com/office/drawing/2014/main" id="{1130010D-3410-41E3-87EF-476411BEC0AA}"/>
+              </a:ext>
+            </a:extLst>
+          </p:cNvPr>
+          <p:cNvPicPr>
+            <a:picLocks noChangeAspect="1"/>
+          </p:cNvPicPr>
+          <p:nvPr/>
+        </p:nvPicPr>
+        <p:blipFill>
+          <a:blip r:embed="rId5">
+            <a:extLst>
+              <a:ext uri="{96DAC541-7B7A-43D3-8B79-37D633B846F1}">
+                <asvg:svgBlip xmlns:asvg="http://schemas.microsoft.com/office/drawing/2016/SVG/main" r:embed="rId6"/>
+              </a:ext>
+            </a:extLst>
+          </a:blip>
+          <a:stretch>
+            <a:fillRect/>
+          </a:stretch>
+        </p:blipFill>
+        <p:spPr>
+          <a:xfrm>
+            <a:off x="4032300" y="1152474"/>
+            <a:ext cx="4800000" cy="3600000"/>
+          </a:xfrm>
+          <a:prstGeom prst="rect">
+            <a:avLst/>
+          </a:prstGeom>
+        </p:spPr>
+      </p:pic>
     </p:spTree>
     <p:extLst>
       <p:ext uri="{BB962C8B-B14F-4D97-AF65-F5344CB8AC3E}">
@@ -25782,7 +25734,19 @@
             </a:r>
             <a:r>
               <a:rPr lang="es-MX" sz="1500" dirty="0"/>
-              <a:t> como la primera.</a:t>
+              <a:t> como la primer</a:t>
+            </a:r>
+            <a:r>
+              <a:rPr lang="es-MX" sz="1500" dirty="0">
+                <a:solidFill>
+                  <a:schemeClr val="accent2"/>
+                </a:solidFill>
+              </a:rPr>
+              <a:t>a</a:t>
+            </a:r>
+            <a:r>
+              <a:rPr lang="es-MX" sz="1500" dirty="0"/>
+              <a:t>.</a:t>
             </a:r>
           </a:p>
           <a:p>
@@ -26190,7 +26154,15 @@
             </a:pPr>
             <a:r>
               <a:rPr lang="en-GB" dirty="0"/>
-              <a:t>II. La regression lineal y sus </a:t>
+              <a:t>II. La </a:t>
+            </a:r>
+            <a:r>
+              <a:rPr lang="en-GB" dirty="0" err="1"/>
+              <a:t>regresión</a:t>
+            </a:r>
+            <a:r>
+              <a:rPr lang="en-GB" dirty="0"/>
+              <a:t> lineal y sus </a:t>
             </a:r>
             <a:r>
               <a:rPr lang="en-GB" dirty="0" err="1"/>

</xml_diff>

<commit_message>
corrijo hoja de ruta
</commit_message>
<xml_diff>
--- a/clase2/teorica_2.pptx
+++ b/clase2/teorica_2.pptx
@@ -11191,7 +11191,7 @@
           <a:p>
             <a:pPr>
               <a:lnSpc>
-                <a:spcPct val="90000"/>
+                <a:spcPct val="120000"/>
               </a:lnSpc>
             </a:pPr>
             <a:r>
@@ -23984,204 +23984,6 @@
       </p:sp>
       <p:sp>
         <p:nvSpPr>
-          <p:cNvPr id="20" name="Hexágono 19">
-            <a:extLst>
-              <a:ext uri="{FF2B5EF4-FFF2-40B4-BE49-F238E27FC236}">
-                <a16:creationId xmlns:a16="http://schemas.microsoft.com/office/drawing/2014/main" id="{C213F2BA-31F1-48E9-92AE-02682E122CBA}"/>
-              </a:ext>
-            </a:extLst>
-          </p:cNvPr>
-          <p:cNvSpPr/>
-          <p:nvPr/>
-        </p:nvSpPr>
-        <p:spPr>
-          <a:xfrm>
-            <a:off x="3003699" y="3935665"/>
-            <a:ext cx="1087946" cy="720000"/>
-          </a:xfrm>
-          <a:prstGeom prst="hexagon">
-            <a:avLst/>
-          </a:prstGeom>
-          <a:noFill/>
-          <a:ln w="12700">
-            <a:solidFill>
-              <a:schemeClr val="accent4"/>
-            </a:solidFill>
-          </a:ln>
-        </p:spPr>
-        <p:style>
-          <a:lnRef idx="2">
-            <a:schemeClr val="accent1">
-              <a:shade val="50000"/>
-            </a:schemeClr>
-          </a:lnRef>
-          <a:fillRef idx="1">
-            <a:schemeClr val="accent1"/>
-          </a:fillRef>
-          <a:effectRef idx="0">
-            <a:schemeClr val="accent1"/>
-          </a:effectRef>
-          <a:fontRef idx="minor">
-            <a:schemeClr val="lt1"/>
-          </a:fontRef>
-        </p:style>
-        <p:txBody>
-          <a:bodyPr rtlCol="0" anchor="ctr"/>
-          <a:lstStyle/>
-          <a:p>
-            <a:pPr algn="ctr"/>
-            <a:r>
-              <a:rPr lang="es-MX" sz="1050" dirty="0">
-                <a:solidFill>
-                  <a:schemeClr val="accent2"/>
-                </a:solidFill>
-                <a:latin typeface="Proxima Nova" panose="020B0604020202020204" charset="0"/>
-              </a:rPr>
-              <a:t>KNN</a:t>
-            </a:r>
-            <a:endParaRPr lang="es-AR" sz="1050" dirty="0">
-              <a:solidFill>
-                <a:schemeClr val="accent2"/>
-              </a:solidFill>
-              <a:latin typeface="Proxima Nova" panose="020B0604020202020204" charset="0"/>
-            </a:endParaRPr>
-          </a:p>
-        </p:txBody>
-      </p:sp>
-      <p:sp>
-        <p:nvSpPr>
-          <p:cNvPr id="21" name="Hexágono 20">
-            <a:extLst>
-              <a:ext uri="{FF2B5EF4-FFF2-40B4-BE49-F238E27FC236}">
-                <a16:creationId xmlns:a16="http://schemas.microsoft.com/office/drawing/2014/main" id="{97216F1F-A4F2-4D04-B1C8-9E2FFD92A4E4}"/>
-              </a:ext>
-            </a:extLst>
-          </p:cNvPr>
-          <p:cNvSpPr/>
-          <p:nvPr/>
-        </p:nvSpPr>
-        <p:spPr>
-          <a:xfrm>
-            <a:off x="4465909" y="3943782"/>
-            <a:ext cx="1087946" cy="720000"/>
-          </a:xfrm>
-          <a:prstGeom prst="hexagon">
-            <a:avLst/>
-          </a:prstGeom>
-          <a:noFill/>
-          <a:ln w="12700">
-            <a:solidFill>
-              <a:schemeClr val="accent4"/>
-            </a:solidFill>
-          </a:ln>
-        </p:spPr>
-        <p:style>
-          <a:lnRef idx="2">
-            <a:schemeClr val="accent1">
-              <a:shade val="50000"/>
-            </a:schemeClr>
-          </a:lnRef>
-          <a:fillRef idx="1">
-            <a:schemeClr val="accent1"/>
-          </a:fillRef>
-          <a:effectRef idx="0">
-            <a:schemeClr val="accent1"/>
-          </a:effectRef>
-          <a:fontRef idx="minor">
-            <a:schemeClr val="lt1"/>
-          </a:fontRef>
-        </p:style>
-        <p:txBody>
-          <a:bodyPr rtlCol="0" anchor="ctr"/>
-          <a:lstStyle/>
-          <a:p>
-            <a:pPr algn="ctr"/>
-            <a:r>
-              <a:rPr lang="es-MX" sz="1050" dirty="0">
-                <a:solidFill>
-                  <a:schemeClr val="accent2"/>
-                </a:solidFill>
-                <a:latin typeface="Proxima Nova" panose="020B0604020202020204" charset="0"/>
-              </a:rPr>
-              <a:t>Regresión logística</a:t>
-            </a:r>
-            <a:endParaRPr lang="es-AR" sz="1050" dirty="0">
-              <a:solidFill>
-                <a:schemeClr val="accent2"/>
-              </a:solidFill>
-              <a:latin typeface="Proxima Nova" panose="020B0604020202020204" charset="0"/>
-            </a:endParaRPr>
-          </a:p>
-        </p:txBody>
-      </p:sp>
-      <p:sp>
-        <p:nvSpPr>
-          <p:cNvPr id="22" name="Hexágono 21">
-            <a:extLst>
-              <a:ext uri="{FF2B5EF4-FFF2-40B4-BE49-F238E27FC236}">
-                <a16:creationId xmlns:a16="http://schemas.microsoft.com/office/drawing/2014/main" id="{9448D5DB-40E2-440C-B311-7317E78E6ED1}"/>
-              </a:ext>
-            </a:extLst>
-          </p:cNvPr>
-          <p:cNvSpPr/>
-          <p:nvPr/>
-        </p:nvSpPr>
-        <p:spPr>
-          <a:xfrm>
-            <a:off x="5594499" y="3943782"/>
-            <a:ext cx="1087946" cy="720000"/>
-          </a:xfrm>
-          <a:prstGeom prst="hexagon">
-            <a:avLst/>
-          </a:prstGeom>
-          <a:noFill/>
-          <a:ln w="12700">
-            <a:solidFill>
-              <a:schemeClr val="accent4"/>
-            </a:solidFill>
-          </a:ln>
-        </p:spPr>
-        <p:style>
-          <a:lnRef idx="2">
-            <a:schemeClr val="accent1">
-              <a:shade val="50000"/>
-            </a:schemeClr>
-          </a:lnRef>
-          <a:fillRef idx="1">
-            <a:schemeClr val="accent1"/>
-          </a:fillRef>
-          <a:effectRef idx="0">
-            <a:schemeClr val="accent1"/>
-          </a:effectRef>
-          <a:fontRef idx="minor">
-            <a:schemeClr val="lt1"/>
-          </a:fontRef>
-        </p:style>
-        <p:txBody>
-          <a:bodyPr rtlCol="0" anchor="ctr"/>
-          <a:lstStyle/>
-          <a:p>
-            <a:pPr algn="ctr"/>
-            <a:r>
-              <a:rPr lang="es-MX" sz="1050" dirty="0">
-                <a:solidFill>
-                  <a:schemeClr val="accent2"/>
-                </a:solidFill>
-                <a:latin typeface="Proxima Nova" panose="020B0604020202020204" charset="0"/>
-              </a:rPr>
-              <a:t>LDA</a:t>
-            </a:r>
-            <a:endParaRPr lang="es-AR" sz="1050" dirty="0">
-              <a:solidFill>
-                <a:schemeClr val="accent2"/>
-              </a:solidFill>
-              <a:latin typeface="Proxima Nova" panose="020B0604020202020204" charset="0"/>
-            </a:endParaRPr>
-          </a:p>
-        </p:txBody>
-      </p:sp>
-      <p:sp>
-        <p:nvSpPr>
           <p:cNvPr id="23" name="Rectángulo: esquinas redondeadas 22">
             <a:extLst>
               <a:ext uri="{FF2B5EF4-FFF2-40B4-BE49-F238E27FC236}">
@@ -24671,138 +24473,6 @@
       </p:cxnSp>
       <p:cxnSp>
         <p:nvCxnSpPr>
-          <p:cNvPr id="52" name="Conector recto 51">
-            <a:extLst>
-              <a:ext uri="{FF2B5EF4-FFF2-40B4-BE49-F238E27FC236}">
-                <a16:creationId xmlns:a16="http://schemas.microsoft.com/office/drawing/2014/main" id="{D05382A2-D7D6-4418-91FA-F06975755EFA}"/>
-              </a:ext>
-            </a:extLst>
-          </p:cNvPr>
-          <p:cNvCxnSpPr>
-            <a:cxnSpLocks/>
-            <a:stCxn id="23" idx="2"/>
-          </p:cNvCxnSpPr>
-          <p:nvPr/>
-        </p:nvCxnSpPr>
-        <p:spPr>
-          <a:xfrm>
-            <a:off x="3547672" y="3668258"/>
-            <a:ext cx="0" cy="252000"/>
-          </a:xfrm>
-          <a:prstGeom prst="line">
-            <a:avLst/>
-          </a:prstGeom>
-          <a:ln w="12700">
-            <a:solidFill>
-              <a:schemeClr val="accent4"/>
-            </a:solidFill>
-          </a:ln>
-        </p:spPr>
-        <p:style>
-          <a:lnRef idx="1">
-            <a:schemeClr val="accent1"/>
-          </a:lnRef>
-          <a:fillRef idx="0">
-            <a:schemeClr val="accent1"/>
-          </a:fillRef>
-          <a:effectRef idx="0">
-            <a:schemeClr val="accent1"/>
-          </a:effectRef>
-          <a:fontRef idx="minor">
-            <a:schemeClr val="tx1"/>
-          </a:fontRef>
-        </p:style>
-      </p:cxnSp>
-      <p:cxnSp>
-        <p:nvCxnSpPr>
-          <p:cNvPr id="55" name="Conector recto 54">
-            <a:extLst>
-              <a:ext uri="{FF2B5EF4-FFF2-40B4-BE49-F238E27FC236}">
-                <a16:creationId xmlns:a16="http://schemas.microsoft.com/office/drawing/2014/main" id="{1C9CA186-BA11-44F3-BB42-E6592CADB14F}"/>
-              </a:ext>
-            </a:extLst>
-          </p:cNvPr>
-          <p:cNvCxnSpPr>
-            <a:cxnSpLocks/>
-            <a:stCxn id="24" idx="2"/>
-          </p:cNvCxnSpPr>
-          <p:nvPr/>
-        </p:nvCxnSpPr>
-        <p:spPr>
-          <a:xfrm flipH="1">
-            <a:off x="5009882" y="3666366"/>
-            <a:ext cx="526486" cy="275524"/>
-          </a:xfrm>
-          <a:prstGeom prst="line">
-            <a:avLst/>
-          </a:prstGeom>
-          <a:ln w="12700">
-            <a:solidFill>
-              <a:schemeClr val="accent4"/>
-            </a:solidFill>
-          </a:ln>
-        </p:spPr>
-        <p:style>
-          <a:lnRef idx="1">
-            <a:schemeClr val="accent1"/>
-          </a:lnRef>
-          <a:fillRef idx="0">
-            <a:schemeClr val="accent1"/>
-          </a:fillRef>
-          <a:effectRef idx="0">
-            <a:schemeClr val="accent1"/>
-          </a:effectRef>
-          <a:fontRef idx="minor">
-            <a:schemeClr val="tx1"/>
-          </a:fontRef>
-        </p:style>
-      </p:cxnSp>
-      <p:cxnSp>
-        <p:nvCxnSpPr>
-          <p:cNvPr id="58" name="Conector recto 57">
-            <a:extLst>
-              <a:ext uri="{FF2B5EF4-FFF2-40B4-BE49-F238E27FC236}">
-                <a16:creationId xmlns:a16="http://schemas.microsoft.com/office/drawing/2014/main" id="{BCF97D6B-32FC-4C6B-B0A5-7FC37875742B}"/>
-              </a:ext>
-            </a:extLst>
-          </p:cNvPr>
-          <p:cNvCxnSpPr>
-            <a:cxnSpLocks/>
-            <a:stCxn id="24" idx="2"/>
-          </p:cNvCxnSpPr>
-          <p:nvPr/>
-        </p:nvCxnSpPr>
-        <p:spPr>
-          <a:xfrm>
-            <a:off x="5536368" y="3666366"/>
-            <a:ext cx="602104" cy="275524"/>
-          </a:xfrm>
-          <a:prstGeom prst="line">
-            <a:avLst/>
-          </a:prstGeom>
-          <a:ln w="12700">
-            <a:solidFill>
-              <a:schemeClr val="accent4"/>
-            </a:solidFill>
-          </a:ln>
-        </p:spPr>
-        <p:style>
-          <a:lnRef idx="1">
-            <a:schemeClr val="accent1"/>
-          </a:lnRef>
-          <a:fillRef idx="0">
-            <a:schemeClr val="accent1"/>
-          </a:fillRef>
-          <a:effectRef idx="0">
-            <a:schemeClr val="accent1"/>
-          </a:effectRef>
-          <a:fontRef idx="minor">
-            <a:schemeClr val="tx1"/>
-          </a:fontRef>
-        </p:style>
-      </p:cxnSp>
-      <p:cxnSp>
-        <p:nvCxnSpPr>
           <p:cNvPr id="60" name="Conector recto 59">
             <a:extLst>
               <a:ext uri="{FF2B5EF4-FFF2-40B4-BE49-F238E27FC236}">
@@ -24888,6 +24558,472 @@
           </a:fontRef>
         </p:style>
       </p:cxnSp>
+      <p:grpSp>
+        <p:nvGrpSpPr>
+          <p:cNvPr id="2" name="Grupo 1">
+            <a:extLst>
+              <a:ext uri="{FF2B5EF4-FFF2-40B4-BE49-F238E27FC236}">
+                <a16:creationId xmlns:a16="http://schemas.microsoft.com/office/drawing/2014/main" id="{518A2968-D1FB-435F-AED1-91757E506662}"/>
+              </a:ext>
+            </a:extLst>
+          </p:cNvPr>
+          <p:cNvGrpSpPr/>
+          <p:nvPr/>
+        </p:nvGrpSpPr>
+        <p:grpSpPr>
+          <a:xfrm>
+            <a:off x="2300992" y="3659971"/>
+            <a:ext cx="4451377" cy="993357"/>
+            <a:chOff x="4746885" y="1644448"/>
+            <a:chExt cx="4451377" cy="993357"/>
+          </a:xfrm>
+        </p:grpSpPr>
+        <p:sp>
+          <p:nvSpPr>
+            <p:cNvPr id="31" name="Hexágono 30">
+              <a:extLst>
+                <a:ext uri="{FF2B5EF4-FFF2-40B4-BE49-F238E27FC236}">
+                  <a16:creationId xmlns:a16="http://schemas.microsoft.com/office/drawing/2014/main" id="{8FB0198F-6CF8-4578-A58E-64372591AA55}"/>
+                </a:ext>
+              </a:extLst>
+            </p:cNvPr>
+            <p:cNvSpPr/>
+            <p:nvPr/>
+          </p:nvSpPr>
+          <p:spPr>
+            <a:xfrm>
+              <a:off x="4746885" y="1917805"/>
+              <a:ext cx="1087946" cy="720000"/>
+            </a:xfrm>
+            <a:prstGeom prst="hexagon">
+              <a:avLst/>
+            </a:prstGeom>
+            <a:noFill/>
+            <a:ln w="12700">
+              <a:solidFill>
+                <a:schemeClr val="accent4"/>
+              </a:solidFill>
+            </a:ln>
+          </p:spPr>
+          <p:style>
+            <a:lnRef idx="2">
+              <a:schemeClr val="accent1">
+                <a:shade val="50000"/>
+              </a:schemeClr>
+            </a:lnRef>
+            <a:fillRef idx="1">
+              <a:schemeClr val="accent1"/>
+            </a:fillRef>
+            <a:effectRef idx="0">
+              <a:schemeClr val="accent1"/>
+            </a:effectRef>
+            <a:fontRef idx="minor">
+              <a:schemeClr val="lt1"/>
+            </a:fontRef>
+          </p:style>
+          <p:txBody>
+            <a:bodyPr rtlCol="0" anchor="ctr"/>
+            <a:lstStyle/>
+            <a:p>
+              <a:pPr algn="ctr"/>
+              <a:r>
+                <a:rPr lang="es-MX" sz="1050">
+                  <a:solidFill>
+                    <a:schemeClr val="accent2"/>
+                  </a:solidFill>
+                  <a:latin typeface="Proxima Nova" panose="020B0604020202020204" charset="0"/>
+                </a:rPr>
+                <a:t>KNN</a:t>
+              </a:r>
+              <a:endParaRPr lang="es-AR" sz="1050" dirty="0">
+                <a:solidFill>
+                  <a:schemeClr val="accent2"/>
+                </a:solidFill>
+                <a:latin typeface="Proxima Nova" panose="020B0604020202020204" charset="0"/>
+              </a:endParaRPr>
+            </a:p>
+          </p:txBody>
+        </p:sp>
+        <p:sp>
+          <p:nvSpPr>
+            <p:cNvPr id="32" name="Hexágono 31">
+              <a:extLst>
+                <a:ext uri="{FF2B5EF4-FFF2-40B4-BE49-F238E27FC236}">
+                  <a16:creationId xmlns:a16="http://schemas.microsoft.com/office/drawing/2014/main" id="{36D773E7-EECA-4E55-AFA2-5A2A5BF3EF25}"/>
+                </a:ext>
+              </a:extLst>
+            </p:cNvPr>
+            <p:cNvSpPr/>
+            <p:nvPr/>
+          </p:nvSpPr>
+          <p:spPr>
+            <a:xfrm>
+              <a:off x="6981726" y="1917805"/>
+              <a:ext cx="1087946" cy="720000"/>
+            </a:xfrm>
+            <a:prstGeom prst="hexagon">
+              <a:avLst/>
+            </a:prstGeom>
+            <a:noFill/>
+            <a:ln w="12700">
+              <a:solidFill>
+                <a:schemeClr val="accent4"/>
+              </a:solidFill>
+            </a:ln>
+          </p:spPr>
+          <p:style>
+            <a:lnRef idx="2">
+              <a:schemeClr val="accent1">
+                <a:shade val="50000"/>
+              </a:schemeClr>
+            </a:lnRef>
+            <a:fillRef idx="1">
+              <a:schemeClr val="accent1"/>
+            </a:fillRef>
+            <a:effectRef idx="0">
+              <a:schemeClr val="accent1"/>
+            </a:effectRef>
+            <a:fontRef idx="minor">
+              <a:schemeClr val="lt1"/>
+            </a:fontRef>
+          </p:style>
+          <p:txBody>
+            <a:bodyPr rtlCol="0" anchor="ctr"/>
+            <a:lstStyle/>
+            <a:p>
+              <a:pPr algn="ctr"/>
+              <a:r>
+                <a:rPr lang="es-MX" sz="1050" dirty="0">
+                  <a:solidFill>
+                    <a:schemeClr val="accent2"/>
+                  </a:solidFill>
+                  <a:latin typeface="Proxima Nova" panose="020B0604020202020204" charset="0"/>
+                </a:rPr>
+                <a:t>Regresión logística</a:t>
+              </a:r>
+              <a:endParaRPr lang="es-AR" sz="1050" dirty="0">
+                <a:solidFill>
+                  <a:schemeClr val="accent2"/>
+                </a:solidFill>
+                <a:latin typeface="Proxima Nova" panose="020B0604020202020204" charset="0"/>
+              </a:endParaRPr>
+            </a:p>
+          </p:txBody>
+        </p:sp>
+        <p:sp>
+          <p:nvSpPr>
+            <p:cNvPr id="34" name="Hexágono 33">
+              <a:extLst>
+                <a:ext uri="{FF2B5EF4-FFF2-40B4-BE49-F238E27FC236}">
+                  <a16:creationId xmlns:a16="http://schemas.microsoft.com/office/drawing/2014/main" id="{C0E3A9EE-F3A4-4CAA-B9D5-CD4A262C3BF3}"/>
+                </a:ext>
+              </a:extLst>
+            </p:cNvPr>
+            <p:cNvSpPr/>
+            <p:nvPr/>
+          </p:nvSpPr>
+          <p:spPr>
+            <a:xfrm>
+              <a:off x="8110316" y="1917805"/>
+              <a:ext cx="1087946" cy="720000"/>
+            </a:xfrm>
+            <a:prstGeom prst="hexagon">
+              <a:avLst/>
+            </a:prstGeom>
+            <a:noFill/>
+            <a:ln w="12700">
+              <a:solidFill>
+                <a:schemeClr val="accent4"/>
+              </a:solidFill>
+            </a:ln>
+          </p:spPr>
+          <p:style>
+            <a:lnRef idx="2">
+              <a:schemeClr val="accent1">
+                <a:shade val="50000"/>
+              </a:schemeClr>
+            </a:lnRef>
+            <a:fillRef idx="1">
+              <a:schemeClr val="accent1"/>
+            </a:fillRef>
+            <a:effectRef idx="0">
+              <a:schemeClr val="accent1"/>
+            </a:effectRef>
+            <a:fontRef idx="minor">
+              <a:schemeClr val="lt1"/>
+            </a:fontRef>
+          </p:style>
+          <p:txBody>
+            <a:bodyPr rtlCol="0" anchor="ctr"/>
+            <a:lstStyle/>
+            <a:p>
+              <a:pPr algn="ctr"/>
+              <a:r>
+                <a:rPr lang="es-MX" sz="1050" dirty="0">
+                  <a:solidFill>
+                    <a:schemeClr val="accent2"/>
+                  </a:solidFill>
+                  <a:latin typeface="Proxima Nova" panose="020B0604020202020204" charset="0"/>
+                </a:rPr>
+                <a:t>LDA/QDA</a:t>
+              </a:r>
+              <a:endParaRPr lang="es-AR" sz="1050" dirty="0">
+                <a:solidFill>
+                  <a:schemeClr val="accent2"/>
+                </a:solidFill>
+                <a:latin typeface="Proxima Nova" panose="020B0604020202020204" charset="0"/>
+              </a:endParaRPr>
+            </a:p>
+          </p:txBody>
+        </p:sp>
+        <p:cxnSp>
+          <p:nvCxnSpPr>
+            <p:cNvPr id="35" name="Conector recto 34">
+              <a:extLst>
+                <a:ext uri="{FF2B5EF4-FFF2-40B4-BE49-F238E27FC236}">
+                  <a16:creationId xmlns:a16="http://schemas.microsoft.com/office/drawing/2014/main" id="{A38937FB-1D48-4CD5-8BC7-6FA3CC0337C9}"/>
+                </a:ext>
+              </a:extLst>
+            </p:cNvPr>
+            <p:cNvCxnSpPr>
+              <a:cxnSpLocks/>
+            </p:cNvCxnSpPr>
+            <p:nvPr/>
+          </p:nvCxnSpPr>
+          <p:spPr>
+            <a:xfrm flipH="1">
+              <a:off x="5301547" y="1646340"/>
+              <a:ext cx="761942" cy="258700"/>
+            </a:xfrm>
+            <a:prstGeom prst="line">
+              <a:avLst/>
+            </a:prstGeom>
+            <a:ln w="12700">
+              <a:solidFill>
+                <a:schemeClr val="accent4"/>
+              </a:solidFill>
+            </a:ln>
+          </p:spPr>
+          <p:style>
+            <a:lnRef idx="1">
+              <a:schemeClr val="accent1"/>
+            </a:lnRef>
+            <a:fillRef idx="0">
+              <a:schemeClr val="accent1"/>
+            </a:fillRef>
+            <a:effectRef idx="0">
+              <a:schemeClr val="accent1"/>
+            </a:effectRef>
+            <a:fontRef idx="minor">
+              <a:schemeClr val="tx1"/>
+            </a:fontRef>
+          </p:style>
+        </p:cxnSp>
+        <p:cxnSp>
+          <p:nvCxnSpPr>
+            <p:cNvPr id="37" name="Conector recto 36">
+              <a:extLst>
+                <a:ext uri="{FF2B5EF4-FFF2-40B4-BE49-F238E27FC236}">
+                  <a16:creationId xmlns:a16="http://schemas.microsoft.com/office/drawing/2014/main" id="{9FED54A3-961E-4111-B779-96E141C4412C}"/>
+                </a:ext>
+              </a:extLst>
+            </p:cNvPr>
+            <p:cNvCxnSpPr>
+              <a:cxnSpLocks/>
+            </p:cNvCxnSpPr>
+            <p:nvPr/>
+          </p:nvCxnSpPr>
+          <p:spPr>
+            <a:xfrm flipH="1">
+              <a:off x="7525699" y="1644448"/>
+              <a:ext cx="526486" cy="275524"/>
+            </a:xfrm>
+            <a:prstGeom prst="line">
+              <a:avLst/>
+            </a:prstGeom>
+            <a:ln w="12700">
+              <a:solidFill>
+                <a:schemeClr val="accent4"/>
+              </a:solidFill>
+            </a:ln>
+          </p:spPr>
+          <p:style>
+            <a:lnRef idx="1">
+              <a:schemeClr val="accent1"/>
+            </a:lnRef>
+            <a:fillRef idx="0">
+              <a:schemeClr val="accent1"/>
+            </a:fillRef>
+            <a:effectRef idx="0">
+              <a:schemeClr val="accent1"/>
+            </a:effectRef>
+            <a:fontRef idx="minor">
+              <a:schemeClr val="tx1"/>
+            </a:fontRef>
+          </p:style>
+        </p:cxnSp>
+        <p:cxnSp>
+          <p:nvCxnSpPr>
+            <p:cNvPr id="38" name="Conector recto 37">
+              <a:extLst>
+                <a:ext uri="{FF2B5EF4-FFF2-40B4-BE49-F238E27FC236}">
+                  <a16:creationId xmlns:a16="http://schemas.microsoft.com/office/drawing/2014/main" id="{66CF836B-7232-4695-857F-820032DFF868}"/>
+                </a:ext>
+              </a:extLst>
+            </p:cNvPr>
+            <p:cNvCxnSpPr>
+              <a:cxnSpLocks/>
+            </p:cNvCxnSpPr>
+            <p:nvPr/>
+          </p:nvCxnSpPr>
+          <p:spPr>
+            <a:xfrm>
+              <a:off x="8052185" y="1644448"/>
+              <a:ext cx="602104" cy="275524"/>
+            </a:xfrm>
+            <a:prstGeom prst="line">
+              <a:avLst/>
+            </a:prstGeom>
+            <a:ln w="12700">
+              <a:solidFill>
+                <a:schemeClr val="accent4"/>
+              </a:solidFill>
+            </a:ln>
+          </p:spPr>
+          <p:style>
+            <a:lnRef idx="1">
+              <a:schemeClr val="accent1"/>
+            </a:lnRef>
+            <a:fillRef idx="0">
+              <a:schemeClr val="accent1"/>
+            </a:fillRef>
+            <a:effectRef idx="0">
+              <a:schemeClr val="accent1"/>
+            </a:effectRef>
+            <a:fontRef idx="minor">
+              <a:schemeClr val="tx1"/>
+            </a:fontRef>
+          </p:style>
+        </p:cxnSp>
+        <p:sp>
+          <p:nvSpPr>
+            <p:cNvPr id="40" name="Hexágono 39">
+              <a:extLst>
+                <a:ext uri="{FF2B5EF4-FFF2-40B4-BE49-F238E27FC236}">
+                  <a16:creationId xmlns:a16="http://schemas.microsoft.com/office/drawing/2014/main" id="{621A4E4F-2505-473A-BB89-D588FFD48DE2}"/>
+                </a:ext>
+              </a:extLst>
+            </p:cNvPr>
+            <p:cNvSpPr/>
+            <p:nvPr/>
+          </p:nvSpPr>
+          <p:spPr>
+            <a:xfrm>
+              <a:off x="5864305" y="1917805"/>
+              <a:ext cx="1087946" cy="720000"/>
+            </a:xfrm>
+            <a:prstGeom prst="hexagon">
+              <a:avLst/>
+            </a:prstGeom>
+            <a:noFill/>
+            <a:ln w="12700">
+              <a:solidFill>
+                <a:schemeClr val="accent4"/>
+              </a:solidFill>
+            </a:ln>
+          </p:spPr>
+          <p:style>
+            <a:lnRef idx="2">
+              <a:schemeClr val="accent1">
+                <a:shade val="50000"/>
+              </a:schemeClr>
+            </a:lnRef>
+            <a:fillRef idx="1">
+              <a:schemeClr val="accent1"/>
+            </a:fillRef>
+            <a:effectRef idx="0">
+              <a:schemeClr val="accent1"/>
+            </a:effectRef>
+            <a:fontRef idx="minor">
+              <a:schemeClr val="lt1"/>
+            </a:fontRef>
+          </p:style>
+          <p:txBody>
+            <a:bodyPr rtlCol="0" anchor="ctr"/>
+            <a:lstStyle/>
+            <a:p>
+              <a:pPr algn="ctr"/>
+              <a:r>
+                <a:rPr lang="es-MX" sz="1050" dirty="0" err="1">
+                  <a:solidFill>
+                    <a:schemeClr val="accent2"/>
+                  </a:solidFill>
+                  <a:latin typeface="Proxima Nova" panose="020B0604020202020204" charset="0"/>
+                </a:rPr>
+                <a:t>Naive</a:t>
+              </a:r>
+              <a:r>
+                <a:rPr lang="es-MX" sz="1050" dirty="0">
+                  <a:solidFill>
+                    <a:schemeClr val="accent2"/>
+                  </a:solidFill>
+                  <a:latin typeface="Proxima Nova" panose="020B0604020202020204" charset="0"/>
+                </a:rPr>
+                <a:t> Bayes</a:t>
+              </a:r>
+              <a:endParaRPr lang="es-AR" sz="1050" dirty="0">
+                <a:solidFill>
+                  <a:schemeClr val="accent2"/>
+                </a:solidFill>
+                <a:latin typeface="Proxima Nova" panose="020B0604020202020204" charset="0"/>
+              </a:endParaRPr>
+            </a:p>
+          </p:txBody>
+        </p:sp>
+        <p:cxnSp>
+          <p:nvCxnSpPr>
+            <p:cNvPr id="41" name="Conector recto 40">
+              <a:extLst>
+                <a:ext uri="{FF2B5EF4-FFF2-40B4-BE49-F238E27FC236}">
+                  <a16:creationId xmlns:a16="http://schemas.microsoft.com/office/drawing/2014/main" id="{5F5E0D86-0F0F-44BA-9889-CFA96B45CED6}"/>
+                </a:ext>
+              </a:extLst>
+            </p:cNvPr>
+            <p:cNvCxnSpPr>
+              <a:cxnSpLocks/>
+            </p:cNvCxnSpPr>
+            <p:nvPr/>
+          </p:nvCxnSpPr>
+          <p:spPr>
+            <a:xfrm>
+              <a:off x="6063489" y="1646340"/>
+              <a:ext cx="344789" cy="270528"/>
+            </a:xfrm>
+            <a:prstGeom prst="line">
+              <a:avLst/>
+            </a:prstGeom>
+            <a:ln w="12700">
+              <a:solidFill>
+                <a:schemeClr val="accent4"/>
+              </a:solidFill>
+            </a:ln>
+          </p:spPr>
+          <p:style>
+            <a:lnRef idx="1">
+              <a:schemeClr val="accent1"/>
+            </a:lnRef>
+            <a:fillRef idx="0">
+              <a:schemeClr val="accent1"/>
+            </a:fillRef>
+            <a:effectRef idx="0">
+              <a:schemeClr val="accent1"/>
+            </a:effectRef>
+            <a:fontRef idx="minor">
+              <a:schemeClr val="tx1"/>
+            </a:fontRef>
+          </p:style>
+        </p:cxnSp>
+      </p:grpSp>
     </p:spTree>
     <p:extLst>
       <p:ext uri="{BB962C8B-B14F-4D97-AF65-F5344CB8AC3E}">
@@ -26252,204 +26388,6 @@
       </p:sp>
       <p:sp>
         <p:nvSpPr>
-          <p:cNvPr id="9" name="Hexágono 8">
-            <a:extLst>
-              <a:ext uri="{FF2B5EF4-FFF2-40B4-BE49-F238E27FC236}">
-                <a16:creationId xmlns:a16="http://schemas.microsoft.com/office/drawing/2014/main" id="{60DB41EE-1B78-4A96-9514-A0F89FC82D7C}"/>
-              </a:ext>
-            </a:extLst>
-          </p:cNvPr>
-          <p:cNvSpPr/>
-          <p:nvPr/>
-        </p:nvSpPr>
-        <p:spPr>
-          <a:xfrm>
-            <a:off x="3813168" y="4258723"/>
-            <a:ext cx="1087946" cy="720000"/>
-          </a:xfrm>
-          <a:prstGeom prst="hexagon">
-            <a:avLst/>
-          </a:prstGeom>
-          <a:noFill/>
-          <a:ln w="12700">
-            <a:solidFill>
-              <a:schemeClr val="accent4"/>
-            </a:solidFill>
-          </a:ln>
-        </p:spPr>
-        <p:style>
-          <a:lnRef idx="2">
-            <a:schemeClr val="accent1">
-              <a:shade val="50000"/>
-            </a:schemeClr>
-          </a:lnRef>
-          <a:fillRef idx="1">
-            <a:schemeClr val="accent1"/>
-          </a:fillRef>
-          <a:effectRef idx="0">
-            <a:schemeClr val="accent1"/>
-          </a:effectRef>
-          <a:fontRef idx="minor">
-            <a:schemeClr val="lt1"/>
-          </a:fontRef>
-        </p:style>
-        <p:txBody>
-          <a:bodyPr rtlCol="0" anchor="ctr"/>
-          <a:lstStyle/>
-          <a:p>
-            <a:pPr algn="ctr"/>
-            <a:r>
-              <a:rPr lang="es-MX" sz="1050" dirty="0">
-                <a:solidFill>
-                  <a:schemeClr val="accent2"/>
-                </a:solidFill>
-                <a:latin typeface="Proxima Nova" panose="020B0604020202020204" charset="0"/>
-              </a:rPr>
-              <a:t>KNN</a:t>
-            </a:r>
-            <a:endParaRPr lang="es-AR" sz="1050" dirty="0">
-              <a:solidFill>
-                <a:schemeClr val="accent2"/>
-              </a:solidFill>
-              <a:latin typeface="Proxima Nova" panose="020B0604020202020204" charset="0"/>
-            </a:endParaRPr>
-          </a:p>
-        </p:txBody>
-      </p:sp>
-      <p:sp>
-        <p:nvSpPr>
-          <p:cNvPr id="10" name="Hexágono 9">
-            <a:extLst>
-              <a:ext uri="{FF2B5EF4-FFF2-40B4-BE49-F238E27FC236}">
-                <a16:creationId xmlns:a16="http://schemas.microsoft.com/office/drawing/2014/main" id="{28FB19C9-391D-40C5-9883-081E5B00C17D}"/>
-              </a:ext>
-            </a:extLst>
-          </p:cNvPr>
-          <p:cNvSpPr/>
-          <p:nvPr/>
-        </p:nvSpPr>
-        <p:spPr>
-          <a:xfrm>
-            <a:off x="5275378" y="4266840"/>
-            <a:ext cx="1087946" cy="720000"/>
-          </a:xfrm>
-          <a:prstGeom prst="hexagon">
-            <a:avLst/>
-          </a:prstGeom>
-          <a:noFill/>
-          <a:ln w="12700">
-            <a:solidFill>
-              <a:schemeClr val="accent4"/>
-            </a:solidFill>
-          </a:ln>
-        </p:spPr>
-        <p:style>
-          <a:lnRef idx="2">
-            <a:schemeClr val="accent1">
-              <a:shade val="50000"/>
-            </a:schemeClr>
-          </a:lnRef>
-          <a:fillRef idx="1">
-            <a:schemeClr val="accent1"/>
-          </a:fillRef>
-          <a:effectRef idx="0">
-            <a:schemeClr val="accent1"/>
-          </a:effectRef>
-          <a:fontRef idx="minor">
-            <a:schemeClr val="lt1"/>
-          </a:fontRef>
-        </p:style>
-        <p:txBody>
-          <a:bodyPr rtlCol="0" anchor="ctr"/>
-          <a:lstStyle/>
-          <a:p>
-            <a:pPr algn="ctr"/>
-            <a:r>
-              <a:rPr lang="es-MX" sz="1050" dirty="0">
-                <a:solidFill>
-                  <a:schemeClr val="accent2"/>
-                </a:solidFill>
-                <a:latin typeface="Proxima Nova" panose="020B0604020202020204" charset="0"/>
-              </a:rPr>
-              <a:t>Regresión logística</a:t>
-            </a:r>
-            <a:endParaRPr lang="es-AR" sz="1050" dirty="0">
-              <a:solidFill>
-                <a:schemeClr val="accent2"/>
-              </a:solidFill>
-              <a:latin typeface="Proxima Nova" panose="020B0604020202020204" charset="0"/>
-            </a:endParaRPr>
-          </a:p>
-        </p:txBody>
-      </p:sp>
-      <p:sp>
-        <p:nvSpPr>
-          <p:cNvPr id="11" name="Hexágono 10">
-            <a:extLst>
-              <a:ext uri="{FF2B5EF4-FFF2-40B4-BE49-F238E27FC236}">
-                <a16:creationId xmlns:a16="http://schemas.microsoft.com/office/drawing/2014/main" id="{44946BEB-6F83-4906-AE4E-CF067F5D1B16}"/>
-              </a:ext>
-            </a:extLst>
-          </p:cNvPr>
-          <p:cNvSpPr/>
-          <p:nvPr/>
-        </p:nvSpPr>
-        <p:spPr>
-          <a:xfrm>
-            <a:off x="6403968" y="4266840"/>
-            <a:ext cx="1087946" cy="720000"/>
-          </a:xfrm>
-          <a:prstGeom prst="hexagon">
-            <a:avLst/>
-          </a:prstGeom>
-          <a:noFill/>
-          <a:ln w="12700">
-            <a:solidFill>
-              <a:schemeClr val="accent4"/>
-            </a:solidFill>
-          </a:ln>
-        </p:spPr>
-        <p:style>
-          <a:lnRef idx="2">
-            <a:schemeClr val="accent1">
-              <a:shade val="50000"/>
-            </a:schemeClr>
-          </a:lnRef>
-          <a:fillRef idx="1">
-            <a:schemeClr val="accent1"/>
-          </a:fillRef>
-          <a:effectRef idx="0">
-            <a:schemeClr val="accent1"/>
-          </a:effectRef>
-          <a:fontRef idx="minor">
-            <a:schemeClr val="lt1"/>
-          </a:fontRef>
-        </p:style>
-        <p:txBody>
-          <a:bodyPr rtlCol="0" anchor="ctr"/>
-          <a:lstStyle/>
-          <a:p>
-            <a:pPr algn="ctr"/>
-            <a:r>
-              <a:rPr lang="es-MX" sz="1050" dirty="0">
-                <a:solidFill>
-                  <a:schemeClr val="accent2"/>
-                </a:solidFill>
-                <a:latin typeface="Proxima Nova" panose="020B0604020202020204" charset="0"/>
-              </a:rPr>
-              <a:t>LDA</a:t>
-            </a:r>
-            <a:endParaRPr lang="es-AR" sz="1050" dirty="0">
-              <a:solidFill>
-                <a:schemeClr val="accent2"/>
-              </a:solidFill>
-              <a:latin typeface="Proxima Nova" panose="020B0604020202020204" charset="0"/>
-            </a:endParaRPr>
-          </a:p>
-        </p:txBody>
-      </p:sp>
-      <p:sp>
-        <p:nvSpPr>
           <p:cNvPr id="12" name="Rectángulo: esquinas redondeadas 11">
             <a:extLst>
               <a:ext uri="{FF2B5EF4-FFF2-40B4-BE49-F238E27FC236}">
@@ -26847,138 +26785,472 @@
           </a:fontRef>
         </p:style>
       </p:cxnSp>
-      <p:cxnSp>
-        <p:nvCxnSpPr>
-          <p:cNvPr id="20" name="Conector recto 19">
+      <p:grpSp>
+        <p:nvGrpSpPr>
+          <p:cNvPr id="2" name="Grupo 1">
             <a:extLst>
               <a:ext uri="{FF2B5EF4-FFF2-40B4-BE49-F238E27FC236}">
-                <a16:creationId xmlns:a16="http://schemas.microsoft.com/office/drawing/2014/main" id="{D6D974C8-1B16-4B68-94F0-46DFC36E8FD5}"/>
+                <a16:creationId xmlns:a16="http://schemas.microsoft.com/office/drawing/2014/main" id="{C2C6F19C-91BF-4E2E-8086-9E0A3329F603}"/>
               </a:ext>
             </a:extLst>
           </p:cNvPr>
-          <p:cNvCxnSpPr>
-            <a:cxnSpLocks/>
-            <a:stCxn id="12" idx="2"/>
-          </p:cNvCxnSpPr>
+          <p:cNvGrpSpPr/>
           <p:nvPr/>
-        </p:nvCxnSpPr>
-        <p:spPr>
+        </p:nvGrpSpPr>
+        <p:grpSpPr>
           <a:xfrm>
-            <a:off x="4357141" y="3991316"/>
-            <a:ext cx="0" cy="252000"/>
+            <a:off x="3045852" y="3989424"/>
+            <a:ext cx="4451377" cy="993357"/>
+            <a:chOff x="2231068" y="3666366"/>
+            <a:chExt cx="4451377" cy="993357"/>
           </a:xfrm>
-          <a:prstGeom prst="line">
-            <a:avLst/>
-          </a:prstGeom>
-          <a:ln>
-            <a:solidFill>
-              <a:schemeClr val="accent4"/>
-            </a:solidFill>
-          </a:ln>
-        </p:spPr>
-        <p:style>
-          <a:lnRef idx="1">
-            <a:schemeClr val="accent1"/>
-          </a:lnRef>
-          <a:fillRef idx="0">
-            <a:schemeClr val="accent1"/>
-          </a:fillRef>
-          <a:effectRef idx="0">
-            <a:schemeClr val="accent1"/>
-          </a:effectRef>
-          <a:fontRef idx="minor">
-            <a:schemeClr val="tx1"/>
-          </a:fontRef>
-        </p:style>
-      </p:cxnSp>
-      <p:cxnSp>
-        <p:nvCxnSpPr>
-          <p:cNvPr id="21" name="Conector recto 20">
-            <a:extLst>
-              <a:ext uri="{FF2B5EF4-FFF2-40B4-BE49-F238E27FC236}">
-                <a16:creationId xmlns:a16="http://schemas.microsoft.com/office/drawing/2014/main" id="{56DC1DBC-1CA2-489E-8AA2-3936E90686DE}"/>
-              </a:ext>
-            </a:extLst>
-          </p:cNvPr>
-          <p:cNvCxnSpPr>
-            <a:cxnSpLocks/>
-            <a:stCxn id="13" idx="2"/>
-          </p:cNvCxnSpPr>
-          <p:nvPr/>
-        </p:nvCxnSpPr>
-        <p:spPr>
-          <a:xfrm flipH="1">
-            <a:off x="5819351" y="3989424"/>
-            <a:ext cx="526486" cy="275524"/>
-          </a:xfrm>
-          <a:prstGeom prst="line">
-            <a:avLst/>
-          </a:prstGeom>
-          <a:ln>
-            <a:solidFill>
-              <a:schemeClr val="accent4"/>
-            </a:solidFill>
-          </a:ln>
-        </p:spPr>
-        <p:style>
-          <a:lnRef idx="1">
-            <a:schemeClr val="accent1"/>
-          </a:lnRef>
-          <a:fillRef idx="0">
-            <a:schemeClr val="accent1"/>
-          </a:fillRef>
-          <a:effectRef idx="0">
-            <a:schemeClr val="accent1"/>
-          </a:effectRef>
-          <a:fontRef idx="minor">
-            <a:schemeClr val="tx1"/>
-          </a:fontRef>
-        </p:style>
-      </p:cxnSp>
-      <p:cxnSp>
-        <p:nvCxnSpPr>
-          <p:cNvPr id="22" name="Conector recto 21">
-            <a:extLst>
-              <a:ext uri="{FF2B5EF4-FFF2-40B4-BE49-F238E27FC236}">
-                <a16:creationId xmlns:a16="http://schemas.microsoft.com/office/drawing/2014/main" id="{06F08179-4EAD-4C1B-B84D-AFF14A3F0BB4}"/>
-              </a:ext>
-            </a:extLst>
-          </p:cNvPr>
-          <p:cNvCxnSpPr>
-            <a:cxnSpLocks/>
-            <a:stCxn id="13" idx="2"/>
-          </p:cNvCxnSpPr>
-          <p:nvPr/>
-        </p:nvCxnSpPr>
-        <p:spPr>
-          <a:xfrm>
-            <a:off x="6345837" y="3989424"/>
-            <a:ext cx="602104" cy="275524"/>
-          </a:xfrm>
-          <a:prstGeom prst="line">
-            <a:avLst/>
-          </a:prstGeom>
-          <a:ln>
-            <a:solidFill>
-              <a:schemeClr val="accent4"/>
-            </a:solidFill>
-          </a:ln>
-        </p:spPr>
-        <p:style>
-          <a:lnRef idx="1">
-            <a:schemeClr val="accent1"/>
-          </a:lnRef>
-          <a:fillRef idx="0">
-            <a:schemeClr val="accent1"/>
-          </a:fillRef>
-          <a:effectRef idx="0">
-            <a:schemeClr val="accent1"/>
-          </a:effectRef>
-          <a:fontRef idx="minor">
-            <a:schemeClr val="tx1"/>
-          </a:fontRef>
-        </p:style>
-      </p:cxnSp>
+        </p:grpSpPr>
+        <p:sp>
+          <p:nvSpPr>
+            <p:cNvPr id="23" name="Hexágono 22">
+              <a:extLst>
+                <a:ext uri="{FF2B5EF4-FFF2-40B4-BE49-F238E27FC236}">
+                  <a16:creationId xmlns:a16="http://schemas.microsoft.com/office/drawing/2014/main" id="{7AF39F0C-3029-48E2-BD56-CFB78482E3E6}"/>
+                </a:ext>
+              </a:extLst>
+            </p:cNvPr>
+            <p:cNvSpPr/>
+            <p:nvPr/>
+          </p:nvSpPr>
+          <p:spPr>
+            <a:xfrm>
+              <a:off x="2231068" y="3939723"/>
+              <a:ext cx="1087946" cy="720000"/>
+            </a:xfrm>
+            <a:prstGeom prst="hexagon">
+              <a:avLst/>
+            </a:prstGeom>
+            <a:noFill/>
+            <a:ln w="12700">
+              <a:solidFill>
+                <a:schemeClr val="accent4"/>
+              </a:solidFill>
+            </a:ln>
+          </p:spPr>
+          <p:style>
+            <a:lnRef idx="2">
+              <a:schemeClr val="accent1">
+                <a:shade val="50000"/>
+              </a:schemeClr>
+            </a:lnRef>
+            <a:fillRef idx="1">
+              <a:schemeClr val="accent1"/>
+            </a:fillRef>
+            <a:effectRef idx="0">
+              <a:schemeClr val="accent1"/>
+            </a:effectRef>
+            <a:fontRef idx="minor">
+              <a:schemeClr val="lt1"/>
+            </a:fontRef>
+          </p:style>
+          <p:txBody>
+            <a:bodyPr rtlCol="0" anchor="ctr"/>
+            <a:lstStyle/>
+            <a:p>
+              <a:pPr algn="ctr"/>
+              <a:r>
+                <a:rPr lang="es-MX" sz="1050">
+                  <a:solidFill>
+                    <a:schemeClr val="accent2"/>
+                  </a:solidFill>
+                  <a:latin typeface="Proxima Nova" panose="020B0604020202020204" charset="0"/>
+                </a:rPr>
+                <a:t>KNN</a:t>
+              </a:r>
+              <a:endParaRPr lang="es-AR" sz="1050" dirty="0">
+                <a:solidFill>
+                  <a:schemeClr val="accent2"/>
+                </a:solidFill>
+                <a:latin typeface="Proxima Nova" panose="020B0604020202020204" charset="0"/>
+              </a:endParaRPr>
+            </a:p>
+          </p:txBody>
+        </p:sp>
+        <p:sp>
+          <p:nvSpPr>
+            <p:cNvPr id="24" name="Hexágono 23">
+              <a:extLst>
+                <a:ext uri="{FF2B5EF4-FFF2-40B4-BE49-F238E27FC236}">
+                  <a16:creationId xmlns:a16="http://schemas.microsoft.com/office/drawing/2014/main" id="{73FAB9E0-98CB-4FC1-8EF0-06DA1F39ADFF}"/>
+                </a:ext>
+              </a:extLst>
+            </p:cNvPr>
+            <p:cNvSpPr/>
+            <p:nvPr/>
+          </p:nvSpPr>
+          <p:spPr>
+            <a:xfrm>
+              <a:off x="4465909" y="3939723"/>
+              <a:ext cx="1087946" cy="720000"/>
+            </a:xfrm>
+            <a:prstGeom prst="hexagon">
+              <a:avLst/>
+            </a:prstGeom>
+            <a:noFill/>
+            <a:ln w="12700">
+              <a:solidFill>
+                <a:schemeClr val="accent4"/>
+              </a:solidFill>
+            </a:ln>
+          </p:spPr>
+          <p:style>
+            <a:lnRef idx="2">
+              <a:schemeClr val="accent1">
+                <a:shade val="50000"/>
+              </a:schemeClr>
+            </a:lnRef>
+            <a:fillRef idx="1">
+              <a:schemeClr val="accent1"/>
+            </a:fillRef>
+            <a:effectRef idx="0">
+              <a:schemeClr val="accent1"/>
+            </a:effectRef>
+            <a:fontRef idx="minor">
+              <a:schemeClr val="lt1"/>
+            </a:fontRef>
+          </p:style>
+          <p:txBody>
+            <a:bodyPr rtlCol="0" anchor="ctr"/>
+            <a:lstStyle/>
+            <a:p>
+              <a:pPr algn="ctr"/>
+              <a:r>
+                <a:rPr lang="es-MX" sz="1050" dirty="0">
+                  <a:solidFill>
+                    <a:schemeClr val="accent2"/>
+                  </a:solidFill>
+                  <a:latin typeface="Proxima Nova" panose="020B0604020202020204" charset="0"/>
+                </a:rPr>
+                <a:t>Regresión logística</a:t>
+              </a:r>
+              <a:endParaRPr lang="es-AR" sz="1050" dirty="0">
+                <a:solidFill>
+                  <a:schemeClr val="accent2"/>
+                </a:solidFill>
+                <a:latin typeface="Proxima Nova" panose="020B0604020202020204" charset="0"/>
+              </a:endParaRPr>
+            </a:p>
+          </p:txBody>
+        </p:sp>
+        <p:sp>
+          <p:nvSpPr>
+            <p:cNvPr id="25" name="Hexágono 24">
+              <a:extLst>
+                <a:ext uri="{FF2B5EF4-FFF2-40B4-BE49-F238E27FC236}">
+                  <a16:creationId xmlns:a16="http://schemas.microsoft.com/office/drawing/2014/main" id="{E37E2F96-F8E0-4F65-82A5-AE5F7A9076E1}"/>
+                </a:ext>
+              </a:extLst>
+            </p:cNvPr>
+            <p:cNvSpPr/>
+            <p:nvPr/>
+          </p:nvSpPr>
+          <p:spPr>
+            <a:xfrm>
+              <a:off x="5594499" y="3939723"/>
+              <a:ext cx="1087946" cy="720000"/>
+            </a:xfrm>
+            <a:prstGeom prst="hexagon">
+              <a:avLst/>
+            </a:prstGeom>
+            <a:noFill/>
+            <a:ln w="12700">
+              <a:solidFill>
+                <a:schemeClr val="accent4"/>
+              </a:solidFill>
+            </a:ln>
+          </p:spPr>
+          <p:style>
+            <a:lnRef idx="2">
+              <a:schemeClr val="accent1">
+                <a:shade val="50000"/>
+              </a:schemeClr>
+            </a:lnRef>
+            <a:fillRef idx="1">
+              <a:schemeClr val="accent1"/>
+            </a:fillRef>
+            <a:effectRef idx="0">
+              <a:schemeClr val="accent1"/>
+            </a:effectRef>
+            <a:fontRef idx="minor">
+              <a:schemeClr val="lt1"/>
+            </a:fontRef>
+          </p:style>
+          <p:txBody>
+            <a:bodyPr rtlCol="0" anchor="ctr"/>
+            <a:lstStyle/>
+            <a:p>
+              <a:pPr algn="ctr"/>
+              <a:r>
+                <a:rPr lang="es-MX" sz="1050" dirty="0">
+                  <a:solidFill>
+                    <a:schemeClr val="accent2"/>
+                  </a:solidFill>
+                  <a:latin typeface="Proxima Nova" panose="020B0604020202020204" charset="0"/>
+                </a:rPr>
+                <a:t>LDA/QDA</a:t>
+              </a:r>
+              <a:endParaRPr lang="es-AR" sz="1050" dirty="0">
+                <a:solidFill>
+                  <a:schemeClr val="accent2"/>
+                </a:solidFill>
+                <a:latin typeface="Proxima Nova" panose="020B0604020202020204" charset="0"/>
+              </a:endParaRPr>
+            </a:p>
+          </p:txBody>
+        </p:sp>
+        <p:cxnSp>
+          <p:nvCxnSpPr>
+            <p:cNvPr id="26" name="Conector recto 25">
+              <a:extLst>
+                <a:ext uri="{FF2B5EF4-FFF2-40B4-BE49-F238E27FC236}">
+                  <a16:creationId xmlns:a16="http://schemas.microsoft.com/office/drawing/2014/main" id="{11B53604-76A8-4003-95E4-505F8233BE03}"/>
+                </a:ext>
+              </a:extLst>
+            </p:cNvPr>
+            <p:cNvCxnSpPr>
+              <a:cxnSpLocks/>
+            </p:cNvCxnSpPr>
+            <p:nvPr/>
+          </p:nvCxnSpPr>
+          <p:spPr>
+            <a:xfrm flipH="1">
+              <a:off x="2785730" y="3668258"/>
+              <a:ext cx="761942" cy="258700"/>
+            </a:xfrm>
+            <a:prstGeom prst="line">
+              <a:avLst/>
+            </a:prstGeom>
+            <a:ln w="12700">
+              <a:solidFill>
+                <a:schemeClr val="accent4"/>
+              </a:solidFill>
+            </a:ln>
+          </p:spPr>
+          <p:style>
+            <a:lnRef idx="1">
+              <a:schemeClr val="accent1"/>
+            </a:lnRef>
+            <a:fillRef idx="0">
+              <a:schemeClr val="accent1"/>
+            </a:fillRef>
+            <a:effectRef idx="0">
+              <a:schemeClr val="accent1"/>
+            </a:effectRef>
+            <a:fontRef idx="minor">
+              <a:schemeClr val="tx1"/>
+            </a:fontRef>
+          </p:style>
+        </p:cxnSp>
+        <p:cxnSp>
+          <p:nvCxnSpPr>
+            <p:cNvPr id="27" name="Conector recto 26">
+              <a:extLst>
+                <a:ext uri="{FF2B5EF4-FFF2-40B4-BE49-F238E27FC236}">
+                  <a16:creationId xmlns:a16="http://schemas.microsoft.com/office/drawing/2014/main" id="{F333DE06-9C68-4B6A-9CF9-FB9042077FD2}"/>
+                </a:ext>
+              </a:extLst>
+            </p:cNvPr>
+            <p:cNvCxnSpPr>
+              <a:cxnSpLocks/>
+            </p:cNvCxnSpPr>
+            <p:nvPr/>
+          </p:nvCxnSpPr>
+          <p:spPr>
+            <a:xfrm flipH="1">
+              <a:off x="5009882" y="3666366"/>
+              <a:ext cx="526486" cy="275524"/>
+            </a:xfrm>
+            <a:prstGeom prst="line">
+              <a:avLst/>
+            </a:prstGeom>
+            <a:ln w="12700">
+              <a:solidFill>
+                <a:schemeClr val="accent4"/>
+              </a:solidFill>
+            </a:ln>
+          </p:spPr>
+          <p:style>
+            <a:lnRef idx="1">
+              <a:schemeClr val="accent1"/>
+            </a:lnRef>
+            <a:fillRef idx="0">
+              <a:schemeClr val="accent1"/>
+            </a:fillRef>
+            <a:effectRef idx="0">
+              <a:schemeClr val="accent1"/>
+            </a:effectRef>
+            <a:fontRef idx="minor">
+              <a:schemeClr val="tx1"/>
+            </a:fontRef>
+          </p:style>
+        </p:cxnSp>
+        <p:cxnSp>
+          <p:nvCxnSpPr>
+            <p:cNvPr id="28" name="Conector recto 27">
+              <a:extLst>
+                <a:ext uri="{FF2B5EF4-FFF2-40B4-BE49-F238E27FC236}">
+                  <a16:creationId xmlns:a16="http://schemas.microsoft.com/office/drawing/2014/main" id="{D4609DFE-5A86-431E-A84C-6546212CD2C2}"/>
+                </a:ext>
+              </a:extLst>
+            </p:cNvPr>
+            <p:cNvCxnSpPr>
+              <a:cxnSpLocks/>
+            </p:cNvCxnSpPr>
+            <p:nvPr/>
+          </p:nvCxnSpPr>
+          <p:spPr>
+            <a:xfrm>
+              <a:off x="5536368" y="3666366"/>
+              <a:ext cx="602104" cy="275524"/>
+            </a:xfrm>
+            <a:prstGeom prst="line">
+              <a:avLst/>
+            </a:prstGeom>
+            <a:ln w="12700">
+              <a:solidFill>
+                <a:schemeClr val="accent4"/>
+              </a:solidFill>
+            </a:ln>
+          </p:spPr>
+          <p:style>
+            <a:lnRef idx="1">
+              <a:schemeClr val="accent1"/>
+            </a:lnRef>
+            <a:fillRef idx="0">
+              <a:schemeClr val="accent1"/>
+            </a:fillRef>
+            <a:effectRef idx="0">
+              <a:schemeClr val="accent1"/>
+            </a:effectRef>
+            <a:fontRef idx="minor">
+              <a:schemeClr val="tx1"/>
+            </a:fontRef>
+          </p:style>
+        </p:cxnSp>
+        <p:sp>
+          <p:nvSpPr>
+            <p:cNvPr id="29" name="Hexágono 28">
+              <a:extLst>
+                <a:ext uri="{FF2B5EF4-FFF2-40B4-BE49-F238E27FC236}">
+                  <a16:creationId xmlns:a16="http://schemas.microsoft.com/office/drawing/2014/main" id="{0F83ACC8-E409-4C9C-BE1E-9198012EBB14}"/>
+                </a:ext>
+              </a:extLst>
+            </p:cNvPr>
+            <p:cNvSpPr/>
+            <p:nvPr/>
+          </p:nvSpPr>
+          <p:spPr>
+            <a:xfrm>
+              <a:off x="3348488" y="3939723"/>
+              <a:ext cx="1087946" cy="720000"/>
+            </a:xfrm>
+            <a:prstGeom prst="hexagon">
+              <a:avLst/>
+            </a:prstGeom>
+            <a:noFill/>
+            <a:ln w="12700">
+              <a:solidFill>
+                <a:schemeClr val="accent4"/>
+              </a:solidFill>
+            </a:ln>
+          </p:spPr>
+          <p:style>
+            <a:lnRef idx="2">
+              <a:schemeClr val="accent1">
+                <a:shade val="50000"/>
+              </a:schemeClr>
+            </a:lnRef>
+            <a:fillRef idx="1">
+              <a:schemeClr val="accent1"/>
+            </a:fillRef>
+            <a:effectRef idx="0">
+              <a:schemeClr val="accent1"/>
+            </a:effectRef>
+            <a:fontRef idx="minor">
+              <a:schemeClr val="lt1"/>
+            </a:fontRef>
+          </p:style>
+          <p:txBody>
+            <a:bodyPr rtlCol="0" anchor="ctr"/>
+            <a:lstStyle/>
+            <a:p>
+              <a:pPr algn="ctr"/>
+              <a:r>
+                <a:rPr lang="es-MX" sz="1050" dirty="0" err="1">
+                  <a:solidFill>
+                    <a:schemeClr val="accent2"/>
+                  </a:solidFill>
+                  <a:latin typeface="Proxima Nova" panose="020B0604020202020204" charset="0"/>
+                </a:rPr>
+                <a:t>Naive</a:t>
+              </a:r>
+              <a:r>
+                <a:rPr lang="es-MX" sz="1050" dirty="0">
+                  <a:solidFill>
+                    <a:schemeClr val="accent2"/>
+                  </a:solidFill>
+                  <a:latin typeface="Proxima Nova" panose="020B0604020202020204" charset="0"/>
+                </a:rPr>
+                <a:t> Bayes</a:t>
+              </a:r>
+              <a:endParaRPr lang="es-AR" sz="1050" dirty="0">
+                <a:solidFill>
+                  <a:schemeClr val="accent2"/>
+                </a:solidFill>
+                <a:latin typeface="Proxima Nova" panose="020B0604020202020204" charset="0"/>
+              </a:endParaRPr>
+            </a:p>
+          </p:txBody>
+        </p:sp>
+        <p:cxnSp>
+          <p:nvCxnSpPr>
+            <p:cNvPr id="30" name="Conector recto 29">
+              <a:extLst>
+                <a:ext uri="{FF2B5EF4-FFF2-40B4-BE49-F238E27FC236}">
+                  <a16:creationId xmlns:a16="http://schemas.microsoft.com/office/drawing/2014/main" id="{83281128-6C14-4005-8157-0AC2518DB283}"/>
+                </a:ext>
+              </a:extLst>
+            </p:cNvPr>
+            <p:cNvCxnSpPr>
+              <a:cxnSpLocks/>
+            </p:cNvCxnSpPr>
+            <p:nvPr/>
+          </p:nvCxnSpPr>
+          <p:spPr>
+            <a:xfrm>
+              <a:off x="3547672" y="3668258"/>
+              <a:ext cx="344789" cy="270528"/>
+            </a:xfrm>
+            <a:prstGeom prst="line">
+              <a:avLst/>
+            </a:prstGeom>
+            <a:ln w="12700">
+              <a:solidFill>
+                <a:schemeClr val="accent4"/>
+              </a:solidFill>
+            </a:ln>
+          </p:spPr>
+          <p:style>
+            <a:lnRef idx="1">
+              <a:schemeClr val="accent1"/>
+            </a:lnRef>
+            <a:fillRef idx="0">
+              <a:schemeClr val="accent1"/>
+            </a:fillRef>
+            <a:effectRef idx="0">
+              <a:schemeClr val="accent1"/>
+            </a:effectRef>
+            <a:fontRef idx="minor">
+              <a:schemeClr val="tx1"/>
+            </a:fontRef>
+          </p:style>
+        </p:cxnSp>
+      </p:grpSp>
     </p:spTree>
   </p:cSld>
   <p:clrMapOvr>

</xml_diff>